<commit_message>
readme düzenlendi. docs içine yeni görseller eklendi. scriptler düzenlendi
</commit_message>
<xml_diff>
--- a/docs/mimari.pptx
+++ b/docs/mimari.pptx
@@ -104,6 +104,11 @@
       </a:defRPr>
     </a:lvl9pPr>
   </p:defaultTextStyle>
+  <p:extLst>
+    <p:ext uri="{EFAFB233-063F-42B5-8137-9DF3F51BA10A}">
+      <p15:sldGuideLst xmlns:p15="http://schemas.microsoft.com/office/powerpoint/2012/main"/>
+    </p:ext>
+  </p:extLst>
 </p:presentation>
 </file>
 
@@ -254,7 +259,7 @@
           <a:p>
             <a:fld id="{C495C0B1-0F74-4BC6-8333-B4BAB7104E93}" type="datetimeFigureOut">
               <a:rPr lang="en-US" smtClean="0"/>
-              <a:t>11/23/2024</a:t>
+              <a:t>11/24/2024</a:t>
             </a:fld>
             <a:endParaRPr lang="en-US"/>
           </a:p>
@@ -452,7 +457,7 @@
           <a:p>
             <a:fld id="{C495C0B1-0F74-4BC6-8333-B4BAB7104E93}" type="datetimeFigureOut">
               <a:rPr lang="en-US" smtClean="0"/>
-              <a:t>11/23/2024</a:t>
+              <a:t>11/24/2024</a:t>
             </a:fld>
             <a:endParaRPr lang="en-US"/>
           </a:p>
@@ -660,7 +665,7 @@
           <a:p>
             <a:fld id="{C495C0B1-0F74-4BC6-8333-B4BAB7104E93}" type="datetimeFigureOut">
               <a:rPr lang="en-US" smtClean="0"/>
-              <a:t>11/23/2024</a:t>
+              <a:t>11/24/2024</a:t>
             </a:fld>
             <a:endParaRPr lang="en-US"/>
           </a:p>
@@ -858,7 +863,7 @@
           <a:p>
             <a:fld id="{C495C0B1-0F74-4BC6-8333-B4BAB7104E93}" type="datetimeFigureOut">
               <a:rPr lang="en-US" smtClean="0"/>
-              <a:t>11/23/2024</a:t>
+              <a:t>11/24/2024</a:t>
             </a:fld>
             <a:endParaRPr lang="en-US"/>
           </a:p>
@@ -1133,7 +1138,7 @@
           <a:p>
             <a:fld id="{C495C0B1-0F74-4BC6-8333-B4BAB7104E93}" type="datetimeFigureOut">
               <a:rPr lang="en-US" smtClean="0"/>
-              <a:t>11/23/2024</a:t>
+              <a:t>11/24/2024</a:t>
             </a:fld>
             <a:endParaRPr lang="en-US"/>
           </a:p>
@@ -1398,7 +1403,7 @@
           <a:p>
             <a:fld id="{C495C0B1-0F74-4BC6-8333-B4BAB7104E93}" type="datetimeFigureOut">
               <a:rPr lang="en-US" smtClean="0"/>
-              <a:t>11/23/2024</a:t>
+              <a:t>11/24/2024</a:t>
             </a:fld>
             <a:endParaRPr lang="en-US"/>
           </a:p>
@@ -1810,7 +1815,7 @@
           <a:p>
             <a:fld id="{C495C0B1-0F74-4BC6-8333-B4BAB7104E93}" type="datetimeFigureOut">
               <a:rPr lang="en-US" smtClean="0"/>
-              <a:t>11/23/2024</a:t>
+              <a:t>11/24/2024</a:t>
             </a:fld>
             <a:endParaRPr lang="en-US"/>
           </a:p>
@@ -1951,7 +1956,7 @@
           <a:p>
             <a:fld id="{C495C0B1-0F74-4BC6-8333-B4BAB7104E93}" type="datetimeFigureOut">
               <a:rPr lang="en-US" smtClean="0"/>
-              <a:t>11/23/2024</a:t>
+              <a:t>11/24/2024</a:t>
             </a:fld>
             <a:endParaRPr lang="en-US"/>
           </a:p>
@@ -2064,7 +2069,7 @@
           <a:p>
             <a:fld id="{C495C0B1-0F74-4BC6-8333-B4BAB7104E93}" type="datetimeFigureOut">
               <a:rPr lang="en-US" smtClean="0"/>
-              <a:t>11/23/2024</a:t>
+              <a:t>11/24/2024</a:t>
             </a:fld>
             <a:endParaRPr lang="en-US"/>
           </a:p>
@@ -2375,7 +2380,7 @@
           <a:p>
             <a:fld id="{C495C0B1-0F74-4BC6-8333-B4BAB7104E93}" type="datetimeFigureOut">
               <a:rPr lang="en-US" smtClean="0"/>
-              <a:t>11/23/2024</a:t>
+              <a:t>11/24/2024</a:t>
             </a:fld>
             <a:endParaRPr lang="en-US"/>
           </a:p>
@@ -2663,7 +2668,7 @@
           <a:p>
             <a:fld id="{C495C0B1-0F74-4BC6-8333-B4BAB7104E93}" type="datetimeFigureOut">
               <a:rPr lang="en-US" smtClean="0"/>
-              <a:t>11/23/2024</a:t>
+              <a:t>11/24/2024</a:t>
             </a:fld>
             <a:endParaRPr lang="en-US"/>
           </a:p>
@@ -2904,7 +2909,7 @@
           <a:p>
             <a:fld id="{C495C0B1-0F74-4BC6-8333-B4BAB7104E93}" type="datetimeFigureOut">
               <a:rPr lang="en-US" smtClean="0"/>
-              <a:t>11/23/2024</a:t>
+              <a:t>11/24/2024</a:t>
             </a:fld>
             <a:endParaRPr lang="en-US"/>
           </a:p>
@@ -3461,8 +3466,8 @@
         </p:nvSpPr>
         <p:spPr>
           <a:xfrm rot="16200000">
-            <a:off x="2699283" y="3167390"/>
-            <a:ext cx="4008790" cy="523220"/>
+            <a:off x="3262738" y="3167390"/>
+            <a:ext cx="2881879" cy="523220"/>
           </a:xfrm>
           <a:prstGeom prst="rect">
             <a:avLst/>
@@ -3484,7 +3489,7 @@
                   </a:schemeClr>
                 </a:solidFill>
               </a:rPr>
-              <a:t>NGINX LOAD BALANCER</a:t>
+              <a:t>LOAD BALANCER</a:t>
             </a:r>
           </a:p>
         </p:txBody>

</xml_diff>

<commit_message>
mimari çizimi düzenlendi. readme düzenlendi
</commit_message>
<xml_diff>
--- a/docs/mimari.pptx
+++ b/docs/mimari.pptx
@@ -3340,6 +3340,56 @@
       </p:grpSpPr>
       <p:sp>
         <p:nvSpPr>
+          <p:cNvPr id="2" name="Rectangle 1">
+            <a:extLst>
+              <a:ext uri="{FF2B5EF4-FFF2-40B4-BE49-F238E27FC236}">
+                <a16:creationId xmlns:a16="http://schemas.microsoft.com/office/drawing/2014/main" id="{769BD15A-F85B-8DC2-0FDF-953D66DA3684}"/>
+              </a:ext>
+            </a:extLst>
+          </p:cNvPr>
+          <p:cNvSpPr/>
+          <p:nvPr/>
+        </p:nvSpPr>
+        <p:spPr>
+          <a:xfrm>
+            <a:off x="3451124" y="157316"/>
+            <a:ext cx="8406580" cy="5987846"/>
+          </a:xfrm>
+          <a:prstGeom prst="rect">
+            <a:avLst/>
+          </a:prstGeom>
+          <a:noFill/>
+          <a:ln>
+            <a:prstDash val="dash"/>
+          </a:ln>
+        </p:spPr>
+        <p:style>
+          <a:lnRef idx="2">
+            <a:schemeClr val="accent1">
+              <a:shade val="15000"/>
+            </a:schemeClr>
+          </a:lnRef>
+          <a:fillRef idx="1">
+            <a:schemeClr val="accent1"/>
+          </a:fillRef>
+          <a:effectRef idx="0">
+            <a:schemeClr val="accent1"/>
+          </a:effectRef>
+          <a:fontRef idx="minor">
+            <a:schemeClr val="lt1"/>
+          </a:fontRef>
+        </p:style>
+        <p:txBody>
+          <a:bodyPr rtlCol="0" anchor="ctr"/>
+          <a:lstStyle/>
+          <a:p>
+            <a:pPr algn="ctr"/>
+            <a:endParaRPr lang="en-US" dirty="0"/>
+          </a:p>
+        </p:txBody>
+      </p:sp>
+      <p:sp>
+        <p:nvSpPr>
           <p:cNvPr id="9" name="Rectangle 8">
             <a:extLst>
               <a:ext uri="{FF2B5EF4-FFF2-40B4-BE49-F238E27FC236}">
@@ -4121,6 +4171,42 @@
           </a:p>
         </p:txBody>
       </p:sp>
+      <p:pic>
+        <p:nvPicPr>
+          <p:cNvPr id="10" name="Picture 9" descr="A blue whale with blocks in the shape of a ship&#10;&#10;Description automatically generated">
+            <a:extLst>
+              <a:ext uri="{FF2B5EF4-FFF2-40B4-BE49-F238E27FC236}">
+                <a16:creationId xmlns:a16="http://schemas.microsoft.com/office/drawing/2014/main" id="{4F90D905-1B27-F4F9-6F82-78F7E713A66D}"/>
+              </a:ext>
+            </a:extLst>
+          </p:cNvPr>
+          <p:cNvPicPr>
+            <a:picLocks noChangeAspect="1"/>
+          </p:cNvPicPr>
+          <p:nvPr/>
+        </p:nvPicPr>
+        <p:blipFill>
+          <a:blip r:embed="rId6">
+            <a:extLst>
+              <a:ext uri="{28A0092B-C50C-407E-A947-70E740481C1C}">
+                <a14:useLocalDpi xmlns:a14="http://schemas.microsoft.com/office/drawing/2010/main" val="0"/>
+              </a:ext>
+            </a:extLst>
+          </a:blip>
+          <a:stretch>
+            <a:fillRect/>
+          </a:stretch>
+        </p:blipFill>
+        <p:spPr>
+          <a:xfrm>
+            <a:off x="3551280" y="206476"/>
+            <a:ext cx="609889" cy="609889"/>
+          </a:xfrm>
+          <a:prstGeom prst="rect">
+            <a:avLst/>
+          </a:prstGeom>
+        </p:spPr>
+      </p:pic>
     </p:spTree>
     <p:extLst>
       <p:ext uri="{BB962C8B-B14F-4D97-AF65-F5344CB8AC3E}">

</xml_diff>